<commit_message>
ms corrected for a preprint
</commit_message>
<xml_diff>
--- a/figures/fig1_comb.pptx
+++ b/figures/fig1_comb.pptx
@@ -243,7 +243,7 @@
           <a:p>
             <a:fld id="{9915773D-6D45-A545-9BEA-022AEEFB4CE4}" type="datetimeFigureOut">
               <a:rPr lang="en-JP" smtClean="0"/>
-              <a:t>2022/11/01</a:t>
+              <a:t>2022/11/09</a:t>
             </a:fld>
             <a:endParaRPr lang="en-JP"/>
           </a:p>
@@ -413,7 +413,7 @@
           <a:p>
             <a:fld id="{9915773D-6D45-A545-9BEA-022AEEFB4CE4}" type="datetimeFigureOut">
               <a:rPr lang="en-JP" smtClean="0"/>
-              <a:t>2022/11/01</a:t>
+              <a:t>2022/11/09</a:t>
             </a:fld>
             <a:endParaRPr lang="en-JP"/>
           </a:p>
@@ -593,7 +593,7 @@
           <a:p>
             <a:fld id="{9915773D-6D45-A545-9BEA-022AEEFB4CE4}" type="datetimeFigureOut">
               <a:rPr lang="en-JP" smtClean="0"/>
-              <a:t>2022/11/01</a:t>
+              <a:t>2022/11/09</a:t>
             </a:fld>
             <a:endParaRPr lang="en-JP"/>
           </a:p>
@@ -763,7 +763,7 @@
           <a:p>
             <a:fld id="{9915773D-6D45-A545-9BEA-022AEEFB4CE4}" type="datetimeFigureOut">
               <a:rPr lang="en-JP" smtClean="0"/>
-              <a:t>2022/11/01</a:t>
+              <a:t>2022/11/09</a:t>
             </a:fld>
             <a:endParaRPr lang="en-JP"/>
           </a:p>
@@ -1007,7 +1007,7 @@
           <a:p>
             <a:fld id="{9915773D-6D45-A545-9BEA-022AEEFB4CE4}" type="datetimeFigureOut">
               <a:rPr lang="en-JP" smtClean="0"/>
-              <a:t>2022/11/01</a:t>
+              <a:t>2022/11/09</a:t>
             </a:fld>
             <a:endParaRPr lang="en-JP"/>
           </a:p>
@@ -1239,7 +1239,7 @@
           <a:p>
             <a:fld id="{9915773D-6D45-A545-9BEA-022AEEFB4CE4}" type="datetimeFigureOut">
               <a:rPr lang="en-JP" smtClean="0"/>
-              <a:t>2022/11/01</a:t>
+              <a:t>2022/11/09</a:t>
             </a:fld>
             <a:endParaRPr lang="en-JP"/>
           </a:p>
@@ -1606,7 +1606,7 @@
           <a:p>
             <a:fld id="{9915773D-6D45-A545-9BEA-022AEEFB4CE4}" type="datetimeFigureOut">
               <a:rPr lang="en-JP" smtClean="0"/>
-              <a:t>2022/11/01</a:t>
+              <a:t>2022/11/09</a:t>
             </a:fld>
             <a:endParaRPr lang="en-JP"/>
           </a:p>
@@ -1724,7 +1724,7 @@
           <a:p>
             <a:fld id="{9915773D-6D45-A545-9BEA-022AEEFB4CE4}" type="datetimeFigureOut">
               <a:rPr lang="en-JP" smtClean="0"/>
-              <a:t>2022/11/01</a:t>
+              <a:t>2022/11/09</a:t>
             </a:fld>
             <a:endParaRPr lang="en-JP"/>
           </a:p>
@@ -1819,7 +1819,7 @@
           <a:p>
             <a:fld id="{9915773D-6D45-A545-9BEA-022AEEFB4CE4}" type="datetimeFigureOut">
               <a:rPr lang="en-JP" smtClean="0"/>
-              <a:t>2022/11/01</a:t>
+              <a:t>2022/11/09</a:t>
             </a:fld>
             <a:endParaRPr lang="en-JP"/>
           </a:p>
@@ -2096,7 +2096,7 @@
           <a:p>
             <a:fld id="{9915773D-6D45-A545-9BEA-022AEEFB4CE4}" type="datetimeFigureOut">
               <a:rPr lang="en-JP" smtClean="0"/>
-              <a:t>2022/11/01</a:t>
+              <a:t>2022/11/09</a:t>
             </a:fld>
             <a:endParaRPr lang="en-JP"/>
           </a:p>
@@ -2353,7 +2353,7 @@
           <a:p>
             <a:fld id="{9915773D-6D45-A545-9BEA-022AEEFB4CE4}" type="datetimeFigureOut">
               <a:rPr lang="en-JP" smtClean="0"/>
-              <a:t>2022/11/01</a:t>
+              <a:t>2022/11/09</a:t>
             </a:fld>
             <a:endParaRPr lang="en-JP"/>
           </a:p>
@@ -2566,7 +2566,7 @@
           <a:p>
             <a:fld id="{9915773D-6D45-A545-9BEA-022AEEFB4CE4}" type="datetimeFigureOut">
               <a:rPr lang="en-JP" smtClean="0"/>
-              <a:t>2022/11/01</a:t>
+              <a:t>2022/11/09</a:t>
             </a:fld>
             <a:endParaRPr lang="en-JP"/>
           </a:p>
@@ -3164,7 +3164,7 @@
           </a:prstGeom>
           <a:ln w="28575">
             <a:solidFill>
-              <a:srgbClr val="FF0000"/>
+              <a:schemeClr val="tx1"/>
             </a:solidFill>
             <a:tailEnd type="triangle"/>
           </a:ln>
@@ -3208,95 +3208,7 @@
           </a:prstGeom>
           <a:ln w="28575">
             <a:solidFill>
-              <a:srgbClr val="FF0000"/>
-            </a:solidFill>
-            <a:tailEnd type="triangle"/>
-          </a:ln>
-        </p:spPr>
-        <p:style>
-          <a:lnRef idx="1">
-            <a:schemeClr val="accent1"/>
-          </a:lnRef>
-          <a:fillRef idx="0">
-            <a:schemeClr val="accent1"/>
-          </a:fillRef>
-          <a:effectRef idx="0">
-            <a:schemeClr val="accent1"/>
-          </a:effectRef>
-          <a:fontRef idx="minor">
-            <a:schemeClr val="tx1"/>
-          </a:fontRef>
-        </p:style>
-      </p:cxnSp>
-      <p:cxnSp>
-        <p:nvCxnSpPr>
-          <p:cNvPr id="44" name="Straight Arrow Connector 43">
-            <a:extLst>
-              <a:ext uri="{FF2B5EF4-FFF2-40B4-BE49-F238E27FC236}">
-                <a16:creationId xmlns:a16="http://schemas.microsoft.com/office/drawing/2014/main" id="{FC3DD1FC-6831-851F-32C4-35CBD1DC9579}"/>
-              </a:ext>
-            </a:extLst>
-          </p:cNvPr>
-          <p:cNvCxnSpPr>
-            <a:cxnSpLocks/>
-          </p:cNvCxnSpPr>
-          <p:nvPr/>
-        </p:nvCxnSpPr>
-        <p:spPr>
-          <a:xfrm flipH="1">
-            <a:off x="3094506" y="999553"/>
-            <a:ext cx="504000" cy="0"/>
-          </a:xfrm>
-          <a:prstGeom prst="straightConnector1">
-            <a:avLst/>
-          </a:prstGeom>
-          <a:ln w="28575">
-            <a:solidFill>
-              <a:srgbClr val="FF0000"/>
-            </a:solidFill>
-            <a:tailEnd type="triangle"/>
-          </a:ln>
-        </p:spPr>
-        <p:style>
-          <a:lnRef idx="1">
-            <a:schemeClr val="accent1"/>
-          </a:lnRef>
-          <a:fillRef idx="0">
-            <a:schemeClr val="accent1"/>
-          </a:fillRef>
-          <a:effectRef idx="0">
-            <a:schemeClr val="accent1"/>
-          </a:effectRef>
-          <a:fontRef idx="minor">
-            <a:schemeClr val="tx1"/>
-          </a:fontRef>
-        </p:style>
-      </p:cxnSp>
-      <p:cxnSp>
-        <p:nvCxnSpPr>
-          <p:cNvPr id="45" name="Straight Arrow Connector 44">
-            <a:extLst>
-              <a:ext uri="{FF2B5EF4-FFF2-40B4-BE49-F238E27FC236}">
-                <a16:creationId xmlns:a16="http://schemas.microsoft.com/office/drawing/2014/main" id="{93923F54-2F32-A59B-6180-AB1F4B9785B7}"/>
-              </a:ext>
-            </a:extLst>
-          </p:cNvPr>
-          <p:cNvCxnSpPr>
-            <a:cxnSpLocks/>
-          </p:cNvCxnSpPr>
-          <p:nvPr/>
-        </p:nvCxnSpPr>
-        <p:spPr>
-          <a:xfrm>
-            <a:off x="2493873" y="996676"/>
-            <a:ext cx="612000" cy="0"/>
-          </a:xfrm>
-          <a:prstGeom prst="straightConnector1">
-            <a:avLst/>
-          </a:prstGeom>
-          <a:ln w="28575">
-            <a:solidFill>
-              <a:srgbClr val="FF0000"/>
+              <a:schemeClr val="tx1"/>
             </a:solidFill>
             <a:tailEnd type="triangle"/>
           </a:ln>
@@ -3340,7 +3252,7 @@
           </a:prstGeom>
           <a:ln w="28575">
             <a:solidFill>
-              <a:srgbClr val="FF0000"/>
+              <a:schemeClr val="tx1"/>
             </a:solidFill>
             <a:tailEnd type="triangle"/>
           </a:ln>
@@ -3544,7 +3456,7 @@
         </p:nvSpPr>
         <p:spPr>
           <a:xfrm>
-            <a:off x="1610571" y="689398"/>
+            <a:off x="1610571" y="700284"/>
             <a:ext cx="1128642" cy="276999"/>
           </a:xfrm>
           <a:prstGeom prst="rect">
@@ -3564,47 +3476,6 @@
                 <a:cs typeface="Arial" panose="020B0604020202020204" pitchFamily="34" charset="0"/>
               </a:rPr>
               <a:t>AT3G13880.1</a:t>
-            </a:r>
-          </a:p>
-        </p:txBody>
-      </p:sp>
-      <p:sp>
-        <p:nvSpPr>
-          <p:cNvPr id="61" name="TextBox 60">
-            <a:extLst>
-              <a:ext uri="{FF2B5EF4-FFF2-40B4-BE49-F238E27FC236}">
-                <a16:creationId xmlns:a16="http://schemas.microsoft.com/office/drawing/2014/main" id="{3B8EB245-783C-1665-6159-45397260D2DB}"/>
-              </a:ext>
-            </a:extLst>
-          </p:cNvPr>
-          <p:cNvSpPr txBox="1"/>
-          <p:nvPr/>
-        </p:nvSpPr>
-        <p:spPr>
-          <a:xfrm>
-            <a:off x="1979829" y="1038025"/>
-            <a:ext cx="1128642" cy="276999"/>
-          </a:xfrm>
-          <a:prstGeom prst="rect">
-            <a:avLst/>
-          </a:prstGeom>
-          <a:noFill/>
-        </p:spPr>
-        <p:txBody>
-          <a:bodyPr wrap="none" rtlCol="0">
-            <a:spAutoFit/>
-          </a:bodyPr>
-          <a:lstStyle/>
-          <a:p>
-            <a:r>
-              <a:rPr lang="en-JP" sz="1200" dirty="0">
-                <a:solidFill>
-                  <a:srgbClr val="FF0000"/>
-                </a:solidFill>
-                <a:latin typeface="Arial" panose="020B0604020202020204" pitchFamily="34" charset="0"/>
-                <a:cs typeface="Arial" panose="020B0604020202020204" pitchFamily="34" charset="0"/>
-              </a:rPr>
-              <a:t>AT3G13882.1</a:t>
             </a:r>
           </a:p>
         </p:txBody>
@@ -3623,8 +3494,8 @@
         </p:nvSpPr>
         <p:spPr>
           <a:xfrm>
-            <a:off x="1989352" y="1404745"/>
-            <a:ext cx="1128642" cy="276999"/>
+            <a:off x="1945808" y="1361201"/>
+            <a:ext cx="2193036" cy="276999"/>
           </a:xfrm>
           <a:prstGeom prst="rect">
             <a:avLst/>
@@ -3639,13 +3510,10 @@
           <a:p>
             <a:r>
               <a:rPr lang="en-JP" sz="1200" dirty="0">
-                <a:solidFill>
-                  <a:srgbClr val="FF0000"/>
-                </a:solidFill>
                 <a:latin typeface="Arial" panose="020B0604020202020204" pitchFamily="34" charset="0"/>
                 <a:cs typeface="Arial" panose="020B0604020202020204" pitchFamily="34" charset="0"/>
               </a:rPr>
-              <a:t>AT3G13882.2</a:t>
+              <a:t>AT3G13882 (ribosomal gene)</a:t>
             </a:r>
           </a:p>
         </p:txBody>
@@ -3664,8 +3532,8 @@
         </p:nvSpPr>
         <p:spPr>
           <a:xfrm>
-            <a:off x="3067871" y="700563"/>
-            <a:ext cx="1128642" cy="276999"/>
+            <a:off x="2752185" y="700563"/>
+            <a:ext cx="1657633" cy="276999"/>
           </a:xfrm>
           <a:prstGeom prst="rect">
             <a:avLst/>
@@ -3680,95 +3548,24 @@
           <a:p>
             <a:r>
               <a:rPr lang="en-JP" sz="1200" dirty="0">
-                <a:solidFill>
-                  <a:srgbClr val="FF0000"/>
-                </a:solidFill>
                 <a:latin typeface="Arial" panose="020B0604020202020204" pitchFamily="34" charset="0"/>
                 <a:cs typeface="Arial" panose="020B0604020202020204" pitchFamily="34" charset="0"/>
               </a:rPr>
-              <a:t>AT3G13890.1</a:t>
-            </a:r>
-          </a:p>
-        </p:txBody>
-      </p:sp>
-      <p:sp>
-        <p:nvSpPr>
-          <p:cNvPr id="65" name="TextBox 64">
-            <a:extLst>
-              <a:ext uri="{FF2B5EF4-FFF2-40B4-BE49-F238E27FC236}">
-                <a16:creationId xmlns:a16="http://schemas.microsoft.com/office/drawing/2014/main" id="{FC62B413-B53B-0CD4-B1D7-E2665D0A54A1}"/>
-              </a:ext>
-            </a:extLst>
-          </p:cNvPr>
-          <p:cNvSpPr txBox="1"/>
-          <p:nvPr/>
-        </p:nvSpPr>
-        <p:spPr>
-          <a:xfrm>
-            <a:off x="3077518" y="1009451"/>
-            <a:ext cx="1128642" cy="276999"/>
-          </a:xfrm>
-          <a:prstGeom prst="rect">
-            <a:avLst/>
-          </a:prstGeom>
-          <a:noFill/>
-        </p:spPr>
-        <p:txBody>
-          <a:bodyPr wrap="none" rtlCol="0">
-            <a:spAutoFit/>
-          </a:bodyPr>
-          <a:lstStyle/>
-          <a:p>
-            <a:r>
-              <a:rPr lang="en-JP" sz="1200" dirty="0">
-                <a:solidFill>
-                  <a:srgbClr val="FF0000"/>
-                </a:solidFill>
-                <a:latin typeface="Arial" panose="020B0604020202020204" pitchFamily="34" charset="0"/>
-                <a:cs typeface="Arial" panose="020B0604020202020204" pitchFamily="34" charset="0"/>
-              </a:rPr>
-              <a:t>AT3G13890.2</a:t>
-            </a:r>
-          </a:p>
-        </p:txBody>
-      </p:sp>
-      <p:sp>
-        <p:nvSpPr>
-          <p:cNvPr id="71" name="TextBox 70">
-            <a:extLst>
-              <a:ext uri="{FF2B5EF4-FFF2-40B4-BE49-F238E27FC236}">
-                <a16:creationId xmlns:a16="http://schemas.microsoft.com/office/drawing/2014/main" id="{7DAC161C-AF3F-BBAE-F5FF-80502DB144E3}"/>
-              </a:ext>
-            </a:extLst>
-          </p:cNvPr>
-          <p:cNvSpPr txBox="1"/>
-          <p:nvPr/>
-        </p:nvSpPr>
-        <p:spPr>
-          <a:xfrm>
-            <a:off x="3194830" y="347686"/>
-            <a:ext cx="696024" cy="276999"/>
-          </a:xfrm>
-          <a:prstGeom prst="rect">
-            <a:avLst/>
-          </a:prstGeom>
-          <a:noFill/>
-        </p:spPr>
-        <p:txBody>
-          <a:bodyPr wrap="none" rtlCol="0">
-            <a:spAutoFit/>
-          </a:bodyPr>
-          <a:lstStyle/>
-          <a:p>
-            <a:r>
-              <a:rPr lang="en-JP" sz="1200" b="1" i="1" dirty="0">
-                <a:solidFill>
-                  <a:srgbClr val="FF0000"/>
-                </a:solidFill>
+              <a:t>AT3G13890 (</a:t>
+            </a:r>
+            <a:r>
+              <a:rPr lang="en-JP" sz="1200" i="1" dirty="0">
                 <a:latin typeface="Arial" panose="020B0604020202020204" pitchFamily="34" charset="0"/>
                 <a:cs typeface="Arial" panose="020B0604020202020204" pitchFamily="34" charset="0"/>
               </a:rPr>
               <a:t>MYB26</a:t>
+            </a:r>
+            <a:r>
+              <a:rPr lang="en-JP" sz="1200" dirty="0">
+                <a:latin typeface="Arial" panose="020B0604020202020204" pitchFamily="34" charset="0"/>
+                <a:cs typeface="Arial" panose="020B0604020202020204" pitchFamily="34" charset="0"/>
+              </a:rPr>
+              <a:t>)</a:t>
             </a:r>
           </a:p>
         </p:txBody>
@@ -3787,8 +3584,8 @@
         </p:nvSpPr>
         <p:spPr>
           <a:xfrm>
-            <a:off x="4676793" y="683035"/>
-            <a:ext cx="1128642" cy="276999"/>
+            <a:off x="4448192" y="693921"/>
+            <a:ext cx="1615955" cy="276999"/>
           </a:xfrm>
           <a:prstGeom prst="rect">
             <a:avLst/>
@@ -3803,13 +3600,24 @@
           <a:p>
             <a:r>
               <a:rPr lang="en-JP" sz="1200" dirty="0">
-                <a:solidFill>
-                  <a:srgbClr val="FF0000"/>
-                </a:solidFill>
                 <a:latin typeface="Arial" panose="020B0604020202020204" pitchFamily="34" charset="0"/>
                 <a:cs typeface="Arial" panose="020B0604020202020204" pitchFamily="34" charset="0"/>
               </a:rPr>
-              <a:t>AT3G13898.1</a:t>
+              <a:t>AT3G13898 (</a:t>
+            </a:r>
+            <a:r>
+              <a:rPr lang="en-JP" sz="1200" i="1" dirty="0">
+                <a:latin typeface="Arial" panose="020B0604020202020204" pitchFamily="34" charset="0"/>
+                <a:cs typeface="Arial" panose="020B0604020202020204" pitchFamily="34" charset="0"/>
+              </a:rPr>
+              <a:t>EPFL3</a:t>
+            </a:r>
+            <a:r>
+              <a:rPr lang="en-JP" sz="1200" dirty="0">
+                <a:latin typeface="Arial" panose="020B0604020202020204" pitchFamily="34" charset="0"/>
+                <a:cs typeface="Arial" panose="020B0604020202020204" pitchFamily="34" charset="0"/>
+              </a:rPr>
+              <a:t>)</a:t>
             </a:r>
           </a:p>
         </p:txBody>
@@ -3828,7 +3636,7 @@
         </p:nvSpPr>
         <p:spPr>
           <a:xfrm>
-            <a:off x="5929728" y="666753"/>
+            <a:off x="5929728" y="699411"/>
             <a:ext cx="1128642" cy="276999"/>
           </a:xfrm>
           <a:prstGeom prst="rect">
@@ -4010,95 +3818,6 @@
           </a:fontRef>
         </p:style>
       </p:cxnSp>
-      <p:sp>
-        <p:nvSpPr>
-          <p:cNvPr id="80" name="TextBox 79">
-            <a:extLst>
-              <a:ext uri="{FF2B5EF4-FFF2-40B4-BE49-F238E27FC236}">
-                <a16:creationId xmlns:a16="http://schemas.microsoft.com/office/drawing/2014/main" id="{9547C616-9A11-4FA0-2435-6700591ADE61}"/>
-              </a:ext>
-            </a:extLst>
-          </p:cNvPr>
-          <p:cNvSpPr txBox="1"/>
-          <p:nvPr/>
-        </p:nvSpPr>
-        <p:spPr>
-          <a:xfrm>
-            <a:off x="1945987" y="1669552"/>
-            <a:ext cx="1322798" cy="276999"/>
-          </a:xfrm>
-          <a:prstGeom prst="rect">
-            <a:avLst/>
-          </a:prstGeom>
-          <a:noFill/>
-        </p:spPr>
-        <p:txBody>
-          <a:bodyPr wrap="none" rtlCol="0">
-            <a:spAutoFit/>
-          </a:bodyPr>
-          <a:lstStyle/>
-          <a:p>
-            <a:r>
-              <a:rPr lang="en-JP" sz="1200" b="1" dirty="0">
-                <a:solidFill>
-                  <a:srgbClr val="FF0000"/>
-                </a:solidFill>
-                <a:latin typeface="Arial" panose="020B0604020202020204" pitchFamily="34" charset="0"/>
-                <a:cs typeface="Arial" panose="020B0604020202020204" pitchFamily="34" charset="0"/>
-              </a:rPr>
-              <a:t>ribosomal gene</a:t>
-            </a:r>
-          </a:p>
-        </p:txBody>
-      </p:sp>
-      <p:sp>
-        <p:nvSpPr>
-          <p:cNvPr id="82" name="TextBox 81">
-            <a:extLst>
-              <a:ext uri="{FF2B5EF4-FFF2-40B4-BE49-F238E27FC236}">
-                <a16:creationId xmlns:a16="http://schemas.microsoft.com/office/drawing/2014/main" id="{C56B0FFF-A978-605B-E5D7-272E259BA91C}"/>
-              </a:ext>
-            </a:extLst>
-          </p:cNvPr>
-          <p:cNvSpPr txBox="1"/>
-          <p:nvPr/>
-        </p:nvSpPr>
-        <p:spPr>
-          <a:xfrm>
-            <a:off x="5113062" y="357570"/>
-            <a:ext cx="663964" cy="276999"/>
-          </a:xfrm>
-          <a:prstGeom prst="rect">
-            <a:avLst/>
-          </a:prstGeom>
-          <a:noFill/>
-        </p:spPr>
-        <p:txBody>
-          <a:bodyPr wrap="none" rtlCol="0">
-            <a:spAutoFit/>
-          </a:bodyPr>
-          <a:lstStyle/>
-          <a:p>
-            <a:r>
-              <a:rPr lang="en-US" sz="1200" b="1" i="1" dirty="0">
-                <a:solidFill>
-                  <a:srgbClr val="FF0000"/>
-                </a:solidFill>
-                <a:latin typeface="Arial" panose="020B0604020202020204" pitchFamily="34" charset="0"/>
-                <a:cs typeface="Arial" panose="020B0604020202020204" pitchFamily="34" charset="0"/>
-              </a:rPr>
-              <a:t>EPFL3</a:t>
-            </a:r>
-            <a:endParaRPr lang="en-JP" sz="1200" b="1" i="1" dirty="0">
-              <a:solidFill>
-                <a:srgbClr val="FF0000"/>
-              </a:solidFill>
-              <a:latin typeface="Arial" panose="020B0604020202020204" pitchFamily="34" charset="0"/>
-              <a:cs typeface="Arial" panose="020B0604020202020204" pitchFamily="34" charset="0"/>
-            </a:endParaRPr>
-          </a:p>
-        </p:txBody>
-      </p:sp>
       <p:sp>
         <p:nvSpPr>
           <p:cNvPr id="2" name="TextBox 1">

</xml_diff>

<commit_message>
ms R1 2nd commit
</commit_message>
<xml_diff>
--- a/figures/fig1_comb.pptx
+++ b/figures/fig1_comb.pptx
@@ -2,12 +2,12 @@
 <file path=ppt/presentation.xml><?xml version="1.0" encoding="utf-8"?>
 <p:presentation xmlns:a="http://schemas.openxmlformats.org/drawingml/2006/main" xmlns:r="http://schemas.openxmlformats.org/officeDocument/2006/relationships" xmlns:p="http://schemas.openxmlformats.org/presentationml/2006/main" saveSubsetFonts="1" autoCompressPictures="0">
   <p:sldMasterIdLst>
-    <p:sldMasterId id="2147483672" r:id="rId1"/>
+    <p:sldMasterId id="2147483708" r:id="rId1"/>
   </p:sldMasterIdLst>
   <p:sldIdLst>
     <p:sldId id="263" r:id="rId2"/>
   </p:sldIdLst>
-  <p:sldSz cx="7559675" cy="6119813"/>
+  <p:sldSz cx="7559675" cy="8280400"/>
   <p:notesSz cx="6858000" cy="9144000"/>
   <p:defaultTextStyle>
     <a:defPPr>
@@ -141,8 +141,8 @@
         </p:nvSpPr>
         <p:spPr>
           <a:xfrm>
-            <a:off x="566976" y="1001553"/>
-            <a:ext cx="6425724" cy="2130602"/>
+            <a:off x="566976" y="1355149"/>
+            <a:ext cx="6425724" cy="2882806"/>
           </a:xfrm>
         </p:spPr>
         <p:txBody>
@@ -173,8 +173,8 @@
         </p:nvSpPr>
         <p:spPr>
           <a:xfrm>
-            <a:off x="944960" y="3214319"/>
-            <a:ext cx="5669756" cy="1477538"/>
+            <a:off x="944960" y="4349128"/>
+            <a:ext cx="5669756" cy="1999179"/>
           </a:xfrm>
         </p:spPr>
         <p:txBody>
@@ -243,7 +243,7 @@
           <a:p>
             <a:fld id="{9915773D-6D45-A545-9BEA-022AEEFB4CE4}" type="datetimeFigureOut">
               <a:rPr lang="en-JP" smtClean="0"/>
-              <a:t>2022/11/09</a:t>
+              <a:t>2023/02/24</a:t>
             </a:fld>
             <a:endParaRPr lang="en-JP"/>
           </a:p>
@@ -294,7 +294,7 @@
     </p:spTree>
     <p:extLst>
       <p:ext uri="{BB962C8B-B14F-4D97-AF65-F5344CB8AC3E}">
-        <p14:creationId xmlns:p14="http://schemas.microsoft.com/office/powerpoint/2010/main" val="255741918"/>
+        <p14:creationId xmlns:p14="http://schemas.microsoft.com/office/powerpoint/2010/main" val="3909500844"/>
       </p:ext>
     </p:extLst>
   </p:cSld>
@@ -413,7 +413,7 @@
           <a:p>
             <a:fld id="{9915773D-6D45-A545-9BEA-022AEEFB4CE4}" type="datetimeFigureOut">
               <a:rPr lang="en-JP" smtClean="0"/>
-              <a:t>2022/11/09</a:t>
+              <a:t>2023/02/24</a:t>
             </a:fld>
             <a:endParaRPr lang="en-JP"/>
           </a:p>
@@ -464,7 +464,7 @@
     </p:spTree>
     <p:extLst>
       <p:ext uri="{BB962C8B-B14F-4D97-AF65-F5344CB8AC3E}">
-        <p14:creationId xmlns:p14="http://schemas.microsoft.com/office/powerpoint/2010/main" val="702684901"/>
+        <p14:creationId xmlns:p14="http://schemas.microsoft.com/office/powerpoint/2010/main" val="2372750222"/>
       </p:ext>
     </p:extLst>
   </p:cSld>
@@ -503,8 +503,8 @@
         </p:nvSpPr>
         <p:spPr>
           <a:xfrm>
-            <a:off x="5409893" y="325823"/>
-            <a:ext cx="1630055" cy="5186259"/>
+            <a:off x="5409893" y="440855"/>
+            <a:ext cx="1630055" cy="7017256"/>
           </a:xfrm>
         </p:spPr>
         <p:txBody>
@@ -531,8 +531,8 @@
         </p:nvSpPr>
         <p:spPr>
           <a:xfrm>
-            <a:off x="519728" y="325823"/>
-            <a:ext cx="4795669" cy="5186259"/>
+            <a:off x="519728" y="440855"/>
+            <a:ext cx="4795669" cy="7017256"/>
           </a:xfrm>
         </p:spPr>
         <p:txBody>
@@ -593,7 +593,7 @@
           <a:p>
             <a:fld id="{9915773D-6D45-A545-9BEA-022AEEFB4CE4}" type="datetimeFigureOut">
               <a:rPr lang="en-JP" smtClean="0"/>
-              <a:t>2022/11/09</a:t>
+              <a:t>2023/02/24</a:t>
             </a:fld>
             <a:endParaRPr lang="en-JP"/>
           </a:p>
@@ -644,7 +644,7 @@
     </p:spTree>
     <p:extLst>
       <p:ext uri="{BB962C8B-B14F-4D97-AF65-F5344CB8AC3E}">
-        <p14:creationId xmlns:p14="http://schemas.microsoft.com/office/powerpoint/2010/main" val="219160631"/>
+        <p14:creationId xmlns:p14="http://schemas.microsoft.com/office/powerpoint/2010/main" val="184266766"/>
       </p:ext>
     </p:extLst>
   </p:cSld>
@@ -763,7 +763,7 @@
           <a:p>
             <a:fld id="{9915773D-6D45-A545-9BEA-022AEEFB4CE4}" type="datetimeFigureOut">
               <a:rPr lang="en-JP" smtClean="0"/>
-              <a:t>2022/11/09</a:t>
+              <a:t>2023/02/24</a:t>
             </a:fld>
             <a:endParaRPr lang="en-JP"/>
           </a:p>
@@ -814,7 +814,7 @@
     </p:spTree>
     <p:extLst>
       <p:ext uri="{BB962C8B-B14F-4D97-AF65-F5344CB8AC3E}">
-        <p14:creationId xmlns:p14="http://schemas.microsoft.com/office/powerpoint/2010/main" val="1082578785"/>
+        <p14:creationId xmlns:p14="http://schemas.microsoft.com/office/powerpoint/2010/main" val="382387423"/>
       </p:ext>
     </p:extLst>
   </p:cSld>
@@ -853,8 +853,8 @@
         </p:nvSpPr>
         <p:spPr>
           <a:xfrm>
-            <a:off x="515791" y="1525705"/>
-            <a:ext cx="6520220" cy="2545672"/>
+            <a:off x="515791" y="2064352"/>
+            <a:ext cx="6520220" cy="3444416"/>
           </a:xfrm>
         </p:spPr>
         <p:txBody>
@@ -885,8 +885,8 @@
         </p:nvSpPr>
         <p:spPr>
           <a:xfrm>
-            <a:off x="515791" y="4095460"/>
-            <a:ext cx="6520220" cy="1338709"/>
+            <a:off x="515791" y="5541353"/>
+            <a:ext cx="6520220" cy="1811337"/>
           </a:xfrm>
         </p:spPr>
         <p:txBody>
@@ -1007,7 +1007,7 @@
           <a:p>
             <a:fld id="{9915773D-6D45-A545-9BEA-022AEEFB4CE4}" type="datetimeFigureOut">
               <a:rPr lang="en-JP" smtClean="0"/>
-              <a:t>2022/11/09</a:t>
+              <a:t>2023/02/24</a:t>
             </a:fld>
             <a:endParaRPr lang="en-JP"/>
           </a:p>
@@ -1058,7 +1058,7 @@
     </p:spTree>
     <p:extLst>
       <p:ext uri="{BB962C8B-B14F-4D97-AF65-F5344CB8AC3E}">
-        <p14:creationId xmlns:p14="http://schemas.microsoft.com/office/powerpoint/2010/main" val="2387755098"/>
+        <p14:creationId xmlns:p14="http://schemas.microsoft.com/office/powerpoint/2010/main" val="3271087300"/>
       </p:ext>
     </p:extLst>
   </p:cSld>
@@ -1120,8 +1120,8 @@
         </p:nvSpPr>
         <p:spPr>
           <a:xfrm>
-            <a:off x="519728" y="1629117"/>
-            <a:ext cx="3212862" cy="3882965"/>
+            <a:off x="519728" y="2204273"/>
+            <a:ext cx="3212862" cy="5253838"/>
           </a:xfrm>
         </p:spPr>
         <p:txBody>
@@ -1177,8 +1177,8 @@
         </p:nvSpPr>
         <p:spPr>
           <a:xfrm>
-            <a:off x="3827085" y="1629117"/>
-            <a:ext cx="3212862" cy="3882965"/>
+            <a:off x="3827085" y="2204273"/>
+            <a:ext cx="3212862" cy="5253838"/>
           </a:xfrm>
         </p:spPr>
         <p:txBody>
@@ -1239,7 +1239,7 @@
           <a:p>
             <a:fld id="{9915773D-6D45-A545-9BEA-022AEEFB4CE4}" type="datetimeFigureOut">
               <a:rPr lang="en-JP" smtClean="0"/>
-              <a:t>2022/11/09</a:t>
+              <a:t>2023/02/24</a:t>
             </a:fld>
             <a:endParaRPr lang="en-JP"/>
           </a:p>
@@ -1290,7 +1290,7 @@
     </p:spTree>
     <p:extLst>
       <p:ext uri="{BB962C8B-B14F-4D97-AF65-F5344CB8AC3E}">
-        <p14:creationId xmlns:p14="http://schemas.microsoft.com/office/powerpoint/2010/main" val="1041005525"/>
+        <p14:creationId xmlns:p14="http://schemas.microsoft.com/office/powerpoint/2010/main" val="544294731"/>
       </p:ext>
     </p:extLst>
   </p:cSld>
@@ -1329,8 +1329,8 @@
         </p:nvSpPr>
         <p:spPr>
           <a:xfrm>
-            <a:off x="520712" y="325825"/>
-            <a:ext cx="6520220" cy="1182881"/>
+            <a:off x="520712" y="440856"/>
+            <a:ext cx="6520220" cy="1600495"/>
           </a:xfrm>
         </p:spPr>
         <p:txBody>
@@ -1357,8 +1357,8 @@
         </p:nvSpPr>
         <p:spPr>
           <a:xfrm>
-            <a:off x="520713" y="1500205"/>
-            <a:ext cx="3198096" cy="735227"/>
+            <a:off x="520713" y="2029849"/>
+            <a:ext cx="3198096" cy="994797"/>
           </a:xfrm>
         </p:spPr>
         <p:txBody>
@@ -1422,8 +1422,8 @@
         </p:nvSpPr>
         <p:spPr>
           <a:xfrm>
-            <a:off x="520713" y="2235432"/>
-            <a:ext cx="3198096" cy="3287983"/>
+            <a:off x="520713" y="3024646"/>
+            <a:ext cx="3198096" cy="4448799"/>
           </a:xfrm>
         </p:spPr>
         <p:txBody>
@@ -1479,8 +1479,8 @@
         </p:nvSpPr>
         <p:spPr>
           <a:xfrm>
-            <a:off x="3827086" y="1500205"/>
-            <a:ext cx="3213847" cy="735227"/>
+            <a:off x="3827086" y="2029849"/>
+            <a:ext cx="3213847" cy="994797"/>
           </a:xfrm>
         </p:spPr>
         <p:txBody>
@@ -1544,8 +1544,8 @@
         </p:nvSpPr>
         <p:spPr>
           <a:xfrm>
-            <a:off x="3827086" y="2235432"/>
-            <a:ext cx="3213847" cy="3287983"/>
+            <a:off x="3827086" y="3024646"/>
+            <a:ext cx="3213847" cy="4448799"/>
           </a:xfrm>
         </p:spPr>
         <p:txBody>
@@ -1606,7 +1606,7 @@
           <a:p>
             <a:fld id="{9915773D-6D45-A545-9BEA-022AEEFB4CE4}" type="datetimeFigureOut">
               <a:rPr lang="en-JP" smtClean="0"/>
-              <a:t>2022/11/09</a:t>
+              <a:t>2023/02/24</a:t>
             </a:fld>
             <a:endParaRPr lang="en-JP"/>
           </a:p>
@@ -1657,7 +1657,7 @@
     </p:spTree>
     <p:extLst>
       <p:ext uri="{BB962C8B-B14F-4D97-AF65-F5344CB8AC3E}">
-        <p14:creationId xmlns:p14="http://schemas.microsoft.com/office/powerpoint/2010/main" val="3823970272"/>
+        <p14:creationId xmlns:p14="http://schemas.microsoft.com/office/powerpoint/2010/main" val="1292498368"/>
       </p:ext>
     </p:extLst>
   </p:cSld>
@@ -1724,7 +1724,7 @@
           <a:p>
             <a:fld id="{9915773D-6D45-A545-9BEA-022AEEFB4CE4}" type="datetimeFigureOut">
               <a:rPr lang="en-JP" smtClean="0"/>
-              <a:t>2022/11/09</a:t>
+              <a:t>2023/02/24</a:t>
             </a:fld>
             <a:endParaRPr lang="en-JP"/>
           </a:p>
@@ -1775,7 +1775,7 @@
     </p:spTree>
     <p:extLst>
       <p:ext uri="{BB962C8B-B14F-4D97-AF65-F5344CB8AC3E}">
-        <p14:creationId xmlns:p14="http://schemas.microsoft.com/office/powerpoint/2010/main" val="833331985"/>
+        <p14:creationId xmlns:p14="http://schemas.microsoft.com/office/powerpoint/2010/main" val="947957544"/>
       </p:ext>
     </p:extLst>
   </p:cSld>
@@ -1819,7 +1819,7 @@
           <a:p>
             <a:fld id="{9915773D-6D45-A545-9BEA-022AEEFB4CE4}" type="datetimeFigureOut">
               <a:rPr lang="en-JP" smtClean="0"/>
-              <a:t>2022/11/09</a:t>
+              <a:t>2023/02/24</a:t>
             </a:fld>
             <a:endParaRPr lang="en-JP"/>
           </a:p>
@@ -1870,7 +1870,7 @@
     </p:spTree>
     <p:extLst>
       <p:ext uri="{BB962C8B-B14F-4D97-AF65-F5344CB8AC3E}">
-        <p14:creationId xmlns:p14="http://schemas.microsoft.com/office/powerpoint/2010/main" val="1015012995"/>
+        <p14:creationId xmlns:p14="http://schemas.microsoft.com/office/powerpoint/2010/main" val="1273366235"/>
       </p:ext>
     </p:extLst>
   </p:cSld>
@@ -1909,8 +1909,8 @@
         </p:nvSpPr>
         <p:spPr>
           <a:xfrm>
-            <a:off x="520712" y="407988"/>
-            <a:ext cx="2438192" cy="1427956"/>
+            <a:off x="520712" y="552027"/>
+            <a:ext cx="2438192" cy="1932093"/>
           </a:xfrm>
         </p:spPr>
         <p:txBody>
@@ -1941,8 +1941,8 @@
         </p:nvSpPr>
         <p:spPr>
           <a:xfrm>
-            <a:off x="3213847" y="881141"/>
-            <a:ext cx="3827085" cy="4349034"/>
+            <a:off x="3213847" y="1192226"/>
+            <a:ext cx="3827085" cy="5884451"/>
           </a:xfrm>
         </p:spPr>
         <p:txBody>
@@ -2026,8 +2026,8 @@
         </p:nvSpPr>
         <p:spPr>
           <a:xfrm>
-            <a:off x="520712" y="1835944"/>
-            <a:ext cx="2438192" cy="3401313"/>
+            <a:off x="520712" y="2484120"/>
+            <a:ext cx="2438192" cy="4602140"/>
           </a:xfrm>
         </p:spPr>
         <p:txBody>
@@ -2096,7 +2096,7 @@
           <a:p>
             <a:fld id="{9915773D-6D45-A545-9BEA-022AEEFB4CE4}" type="datetimeFigureOut">
               <a:rPr lang="en-JP" smtClean="0"/>
-              <a:t>2022/11/09</a:t>
+              <a:t>2023/02/24</a:t>
             </a:fld>
             <a:endParaRPr lang="en-JP"/>
           </a:p>
@@ -2147,7 +2147,7 @@
     </p:spTree>
     <p:extLst>
       <p:ext uri="{BB962C8B-B14F-4D97-AF65-F5344CB8AC3E}">
-        <p14:creationId xmlns:p14="http://schemas.microsoft.com/office/powerpoint/2010/main" val="3319138648"/>
+        <p14:creationId xmlns:p14="http://schemas.microsoft.com/office/powerpoint/2010/main" val="679427354"/>
       </p:ext>
     </p:extLst>
   </p:cSld>
@@ -2186,8 +2186,8 @@
         </p:nvSpPr>
         <p:spPr>
           <a:xfrm>
-            <a:off x="520712" y="407988"/>
-            <a:ext cx="2438192" cy="1427956"/>
+            <a:off x="520712" y="552027"/>
+            <a:ext cx="2438192" cy="1932093"/>
           </a:xfrm>
         </p:spPr>
         <p:txBody>
@@ -2218,8 +2218,8 @@
         </p:nvSpPr>
         <p:spPr>
           <a:xfrm>
-            <a:off x="3213847" y="881141"/>
-            <a:ext cx="3827085" cy="4349034"/>
+            <a:off x="3213847" y="1192226"/>
+            <a:ext cx="3827085" cy="5884451"/>
           </a:xfrm>
         </p:spPr>
         <p:txBody>
@@ -2283,8 +2283,8 @@
         </p:nvSpPr>
         <p:spPr>
           <a:xfrm>
-            <a:off x="520712" y="1835944"/>
-            <a:ext cx="2438192" cy="3401313"/>
+            <a:off x="520712" y="2484120"/>
+            <a:ext cx="2438192" cy="4602140"/>
           </a:xfrm>
         </p:spPr>
         <p:txBody>
@@ -2353,7 +2353,7 @@
           <a:p>
             <a:fld id="{9915773D-6D45-A545-9BEA-022AEEFB4CE4}" type="datetimeFigureOut">
               <a:rPr lang="en-JP" smtClean="0"/>
-              <a:t>2022/11/09</a:t>
+              <a:t>2023/02/24</a:t>
             </a:fld>
             <a:endParaRPr lang="en-JP"/>
           </a:p>
@@ -2404,7 +2404,7 @@
     </p:spTree>
     <p:extLst>
       <p:ext uri="{BB962C8B-B14F-4D97-AF65-F5344CB8AC3E}">
-        <p14:creationId xmlns:p14="http://schemas.microsoft.com/office/powerpoint/2010/main" val="3807490738"/>
+        <p14:creationId xmlns:p14="http://schemas.microsoft.com/office/powerpoint/2010/main" val="3967307166"/>
       </p:ext>
     </p:extLst>
   </p:cSld>
@@ -2448,8 +2448,8 @@
         </p:nvSpPr>
         <p:spPr>
           <a:xfrm>
-            <a:off x="519728" y="325825"/>
-            <a:ext cx="6520220" cy="1182881"/>
+            <a:off x="519728" y="440856"/>
+            <a:ext cx="6520220" cy="1600495"/>
           </a:xfrm>
           <a:prstGeom prst="rect">
             <a:avLst/>
@@ -2481,8 +2481,8 @@
         </p:nvSpPr>
         <p:spPr>
           <a:xfrm>
-            <a:off x="519728" y="1629117"/>
-            <a:ext cx="6520220" cy="3882965"/>
+            <a:off x="519728" y="2204273"/>
+            <a:ext cx="6520220" cy="5253838"/>
           </a:xfrm>
           <a:prstGeom prst="rect">
             <a:avLst/>
@@ -2543,8 +2543,8 @@
         </p:nvSpPr>
         <p:spPr>
           <a:xfrm>
-            <a:off x="519728" y="5672162"/>
-            <a:ext cx="1700927" cy="325823"/>
+            <a:off x="519728" y="7674706"/>
+            <a:ext cx="1700927" cy="440855"/>
           </a:xfrm>
           <a:prstGeom prst="rect">
             <a:avLst/>
@@ -2566,7 +2566,7 @@
           <a:p>
             <a:fld id="{9915773D-6D45-A545-9BEA-022AEEFB4CE4}" type="datetimeFigureOut">
               <a:rPr lang="en-JP" smtClean="0"/>
-              <a:t>2022/11/09</a:t>
+              <a:t>2023/02/24</a:t>
             </a:fld>
             <a:endParaRPr lang="en-JP"/>
           </a:p>
@@ -2584,8 +2584,8 @@
         </p:nvSpPr>
         <p:spPr>
           <a:xfrm>
-            <a:off x="2504143" y="5672162"/>
-            <a:ext cx="2551390" cy="325823"/>
+            <a:off x="2504143" y="7674706"/>
+            <a:ext cx="2551390" cy="440855"/>
           </a:xfrm>
           <a:prstGeom prst="rect">
             <a:avLst/>
@@ -2621,8 +2621,8 @@
         </p:nvSpPr>
         <p:spPr>
           <a:xfrm>
-            <a:off x="5339020" y="5672162"/>
-            <a:ext cx="1700927" cy="325823"/>
+            <a:off x="5339020" y="7674706"/>
+            <a:ext cx="1700927" cy="440855"/>
           </a:xfrm>
           <a:prstGeom prst="rect">
             <a:avLst/>
@@ -2653,23 +2653,23 @@
     </p:spTree>
     <p:extLst>
       <p:ext uri="{BB962C8B-B14F-4D97-AF65-F5344CB8AC3E}">
-        <p14:creationId xmlns:p14="http://schemas.microsoft.com/office/powerpoint/2010/main" val="4028136355"/>
+        <p14:creationId xmlns:p14="http://schemas.microsoft.com/office/powerpoint/2010/main" val="3303870690"/>
       </p:ext>
     </p:extLst>
   </p:cSld>
   <p:clrMap bg1="lt1" tx1="dk1" bg2="lt2" tx2="dk2" accent1="accent1" accent2="accent2" accent3="accent3" accent4="accent4" accent5="accent5" accent6="accent6" hlink="hlink" folHlink="folHlink"/>
   <p:sldLayoutIdLst>
-    <p:sldLayoutId id="2147483673" r:id="rId1"/>
-    <p:sldLayoutId id="2147483674" r:id="rId2"/>
-    <p:sldLayoutId id="2147483675" r:id="rId3"/>
-    <p:sldLayoutId id="2147483676" r:id="rId4"/>
-    <p:sldLayoutId id="2147483677" r:id="rId5"/>
-    <p:sldLayoutId id="2147483678" r:id="rId6"/>
-    <p:sldLayoutId id="2147483679" r:id="rId7"/>
-    <p:sldLayoutId id="2147483680" r:id="rId8"/>
-    <p:sldLayoutId id="2147483681" r:id="rId9"/>
-    <p:sldLayoutId id="2147483682" r:id="rId10"/>
-    <p:sldLayoutId id="2147483683" r:id="rId11"/>
+    <p:sldLayoutId id="2147483709" r:id="rId1"/>
+    <p:sldLayoutId id="2147483710" r:id="rId2"/>
+    <p:sldLayoutId id="2147483711" r:id="rId3"/>
+    <p:sldLayoutId id="2147483712" r:id="rId4"/>
+    <p:sldLayoutId id="2147483713" r:id="rId5"/>
+    <p:sldLayoutId id="2147483714" r:id="rId6"/>
+    <p:sldLayoutId id="2147483715" r:id="rId7"/>
+    <p:sldLayoutId id="2147483716" r:id="rId8"/>
+    <p:sldLayoutId id="2147483717" r:id="rId9"/>
+    <p:sldLayoutId id="2147483718" r:id="rId10"/>
+    <p:sldLayoutId id="2147483719" r:id="rId11"/>
   </p:sldLayoutIdLst>
   <p:txStyles>
     <p:titleStyle>
@@ -2973,10 +2973,10 @@
       </p:grpSpPr>
       <p:pic>
         <p:nvPicPr>
-          <p:cNvPr id="37" name="Picture 36">
+          <p:cNvPr id="86" name="Picture 85">
             <a:extLst>
               <a:ext uri="{FF2B5EF4-FFF2-40B4-BE49-F238E27FC236}">
-                <a16:creationId xmlns:a16="http://schemas.microsoft.com/office/drawing/2014/main" id="{8C7D24FE-BD29-7BAB-F5CA-1FB2E4ABE197}"/>
+                <a16:creationId xmlns:a16="http://schemas.microsoft.com/office/drawing/2014/main" id="{60DD896C-B96A-E2CE-CF48-9AA5D99947B5}"/>
               </a:ext>
             </a:extLst>
           </p:cNvPr>
@@ -2987,25 +2987,83 @@
         </p:nvPicPr>
         <p:blipFill rotWithShape="1">
           <a:blip r:embed="rId2"/>
-          <a:srcRect l="3838"/>
+          <a:srcRect l="11640" b="77301"/>
           <a:stretch/>
         </p:blipFill>
         <p:spPr>
           <a:xfrm>
-            <a:off x="632958" y="2490546"/>
-            <a:ext cx="6785202" cy="3528000"/>
+            <a:off x="620748" y="2647102"/>
+            <a:ext cx="6679752" cy="1715923"/>
           </a:xfrm>
           <a:prstGeom prst="rect">
             <a:avLst/>
           </a:prstGeom>
         </p:spPr>
       </p:pic>
+      <p:pic>
+        <p:nvPicPr>
+          <p:cNvPr id="87" name="Picture 86">
+            <a:extLst>
+              <a:ext uri="{FF2B5EF4-FFF2-40B4-BE49-F238E27FC236}">
+                <a16:creationId xmlns:a16="http://schemas.microsoft.com/office/drawing/2014/main" id="{5F74F7A8-12B4-054E-F407-DE95BF9E1048}"/>
+              </a:ext>
+            </a:extLst>
+          </p:cNvPr>
+          <p:cNvPicPr>
+            <a:picLocks noChangeAspect="1"/>
+          </p:cNvPicPr>
+          <p:nvPr/>
+        </p:nvPicPr>
+        <p:blipFill rotWithShape="1">
+          <a:blip r:embed="rId2"/>
+          <a:srcRect l="11640" t="37195" b="43813"/>
+          <a:stretch/>
+        </p:blipFill>
+        <p:spPr>
+          <a:xfrm>
+            <a:off x="626844" y="4727371"/>
+            <a:ext cx="6679752" cy="1435773"/>
+          </a:xfrm>
+          <a:prstGeom prst="rect">
+            <a:avLst/>
+          </a:prstGeom>
+        </p:spPr>
+      </p:pic>
+      <p:pic>
+        <p:nvPicPr>
+          <p:cNvPr id="88" name="Picture 87">
+            <a:extLst>
+              <a:ext uri="{FF2B5EF4-FFF2-40B4-BE49-F238E27FC236}">
+                <a16:creationId xmlns:a16="http://schemas.microsoft.com/office/drawing/2014/main" id="{FDF2C8E3-1E54-329E-AD77-0B42B7D134DE}"/>
+              </a:ext>
+            </a:extLst>
+          </p:cNvPr>
+          <p:cNvPicPr>
+            <a:picLocks noChangeAspect="1"/>
+          </p:cNvPicPr>
+          <p:nvPr/>
+        </p:nvPicPr>
+        <p:blipFill rotWithShape="1">
+          <a:blip r:embed="rId2"/>
+          <a:srcRect l="11640" t="69826" b="6813"/>
+          <a:stretch/>
+        </p:blipFill>
+        <p:spPr>
+          <a:xfrm>
+            <a:off x="620748" y="6478927"/>
+            <a:ext cx="6679752" cy="1766069"/>
+          </a:xfrm>
+          <a:prstGeom prst="rect">
+            <a:avLst/>
+          </a:prstGeom>
+        </p:spPr>
+      </p:pic>
       <p:cxnSp>
         <p:nvCxnSpPr>
-          <p:cNvPr id="39" name="Straight Arrow Connector 38">
+          <p:cNvPr id="89" name="Straight Arrow Connector 88">
             <a:extLst>
               <a:ext uri="{FF2B5EF4-FFF2-40B4-BE49-F238E27FC236}">
-                <a16:creationId xmlns:a16="http://schemas.microsoft.com/office/drawing/2014/main" id="{D9D9D6AB-0723-FCD8-1790-02BBEEC12662}"/>
+                <a16:creationId xmlns:a16="http://schemas.microsoft.com/office/drawing/2014/main" id="{E4E1ABB2-0A9E-F02E-C892-772279410A01}"/>
               </a:ext>
             </a:extLst>
           </p:cNvPr>
@@ -3016,7 +3074,7 @@
         </p:nvCxnSpPr>
         <p:spPr>
           <a:xfrm>
-            <a:off x="3972435" y="315555"/>
+            <a:off x="3747847" y="115029"/>
             <a:ext cx="13726" cy="2448000"/>
           </a:xfrm>
           <a:prstGeom prst="straightConnector1">
@@ -3046,10 +3104,10 @@
       </p:cxnSp>
       <p:sp>
         <p:nvSpPr>
-          <p:cNvPr id="40" name="Rectangle 39">
+          <p:cNvPr id="90" name="Rectangle 89">
             <a:extLst>
               <a:ext uri="{FF2B5EF4-FFF2-40B4-BE49-F238E27FC236}">
-                <a16:creationId xmlns:a16="http://schemas.microsoft.com/office/drawing/2014/main" id="{BD96DB2E-52A2-966F-21D6-34E2F0AFF742}"/>
+                <a16:creationId xmlns:a16="http://schemas.microsoft.com/office/drawing/2014/main" id="{D577AE37-DBBD-037F-574B-757E6C730836}"/>
               </a:ext>
             </a:extLst>
           </p:cNvPr>
@@ -3058,7 +3116,7 @@
         </p:nvSpPr>
         <p:spPr>
           <a:xfrm>
-            <a:off x="1979829" y="309103"/>
+            <a:off x="1755241" y="108577"/>
             <a:ext cx="4101187" cy="2022846"/>
           </a:xfrm>
           <a:prstGeom prst="rect">
@@ -3098,10 +3156,10 @@
       </p:sp>
       <p:cxnSp>
         <p:nvCxnSpPr>
-          <p:cNvPr id="41" name="Straight Arrow Connector 40">
+          <p:cNvPr id="91" name="Straight Arrow Connector 90">
             <a:extLst>
               <a:ext uri="{FF2B5EF4-FFF2-40B4-BE49-F238E27FC236}">
-                <a16:creationId xmlns:a16="http://schemas.microsoft.com/office/drawing/2014/main" id="{AE2A0EEB-2B84-ACFE-CF40-364A610BA48C}"/>
+                <a16:creationId xmlns:a16="http://schemas.microsoft.com/office/drawing/2014/main" id="{E3244B5A-BE23-7462-8728-020399473850}"/>
               </a:ext>
             </a:extLst>
           </p:cNvPr>
@@ -3112,7 +3170,7 @@
         </p:nvCxnSpPr>
         <p:spPr>
           <a:xfrm>
-            <a:off x="1979829" y="665224"/>
+            <a:off x="1755241" y="464698"/>
             <a:ext cx="609448" cy="0"/>
           </a:xfrm>
           <a:prstGeom prst="straightConnector1">
@@ -3142,10 +3200,10 @@
       </p:cxnSp>
       <p:cxnSp>
         <p:nvCxnSpPr>
-          <p:cNvPr id="42" name="Straight Arrow Connector 41">
+          <p:cNvPr id="92" name="Straight Arrow Connector 91">
             <a:extLst>
               <a:ext uri="{FF2B5EF4-FFF2-40B4-BE49-F238E27FC236}">
-                <a16:creationId xmlns:a16="http://schemas.microsoft.com/office/drawing/2014/main" id="{FD71CDD8-78AA-7AD4-EDCF-4EFFB22184C0}"/>
+                <a16:creationId xmlns:a16="http://schemas.microsoft.com/office/drawing/2014/main" id="{7147F5A4-FB3C-BFE0-43DF-689208879333}"/>
               </a:ext>
             </a:extLst>
           </p:cNvPr>
@@ -3156,7 +3214,7 @@
         </p:nvCxnSpPr>
         <p:spPr>
           <a:xfrm>
-            <a:off x="5266673" y="661414"/>
+            <a:off x="5042085" y="460888"/>
             <a:ext cx="432000" cy="0"/>
           </a:xfrm>
           <a:prstGeom prst="straightConnector1">
@@ -3186,10 +3244,10 @@
       </p:cxnSp>
       <p:cxnSp>
         <p:nvCxnSpPr>
-          <p:cNvPr id="43" name="Straight Arrow Connector 42">
+          <p:cNvPr id="93" name="Straight Arrow Connector 92">
             <a:extLst>
               <a:ext uri="{FF2B5EF4-FFF2-40B4-BE49-F238E27FC236}">
-                <a16:creationId xmlns:a16="http://schemas.microsoft.com/office/drawing/2014/main" id="{A1CF8F49-03DF-B6D3-09E5-6E8DFA5BF76A}"/>
+                <a16:creationId xmlns:a16="http://schemas.microsoft.com/office/drawing/2014/main" id="{4C9D279B-E6AD-CD79-C9D0-EC54E5008CC5}"/>
               </a:ext>
             </a:extLst>
           </p:cNvPr>
@@ -3200,7 +3258,7 @@
         </p:nvCxnSpPr>
         <p:spPr>
           <a:xfrm flipH="1">
-            <a:off x="2927818" y="661412"/>
+            <a:off x="2703230" y="460886"/>
             <a:ext cx="648000" cy="0"/>
           </a:xfrm>
           <a:prstGeom prst="straightConnector1">
@@ -3230,10 +3288,10 @@
       </p:cxnSp>
       <p:cxnSp>
         <p:nvCxnSpPr>
-          <p:cNvPr id="51" name="Straight Arrow Connector 50">
+          <p:cNvPr id="94" name="Straight Arrow Connector 93">
             <a:extLst>
               <a:ext uri="{FF2B5EF4-FFF2-40B4-BE49-F238E27FC236}">
-                <a16:creationId xmlns:a16="http://schemas.microsoft.com/office/drawing/2014/main" id="{E2B35E94-5E98-AEF0-9C38-FBCAB5F86DBD}"/>
+                <a16:creationId xmlns:a16="http://schemas.microsoft.com/office/drawing/2014/main" id="{354468F5-2731-B09D-D2DF-A62E822A7EF8}"/>
               </a:ext>
             </a:extLst>
           </p:cNvPr>
@@ -3244,7 +3302,7 @@
         </p:nvCxnSpPr>
         <p:spPr>
           <a:xfrm>
-            <a:off x="2474821" y="1320530"/>
+            <a:off x="2250233" y="1120004"/>
             <a:ext cx="612000" cy="0"/>
           </a:xfrm>
           <a:prstGeom prst="straightConnector1">
@@ -3274,10 +3332,10 @@
       </p:cxnSp>
       <p:sp>
         <p:nvSpPr>
-          <p:cNvPr id="52" name="TextBox 51">
+          <p:cNvPr id="95" name="TextBox 94">
             <a:extLst>
               <a:ext uri="{FF2B5EF4-FFF2-40B4-BE49-F238E27FC236}">
-                <a16:creationId xmlns:a16="http://schemas.microsoft.com/office/drawing/2014/main" id="{957AE4FB-4A61-68C6-7A91-82F04CCB23CF}"/>
+                <a16:creationId xmlns:a16="http://schemas.microsoft.com/office/drawing/2014/main" id="{E13F214A-39B9-4A90-C94C-5039FD5F21F9}"/>
               </a:ext>
             </a:extLst>
           </p:cNvPr>
@@ -3286,7 +3344,7 @@
         </p:nvSpPr>
         <p:spPr>
           <a:xfrm>
-            <a:off x="2296969" y="2293014"/>
+            <a:off x="2072381" y="2092488"/>
             <a:ext cx="4467698" cy="276999"/>
           </a:xfrm>
           <a:prstGeom prst="rect">
@@ -3312,10 +3370,10 @@
       </p:sp>
       <p:cxnSp>
         <p:nvCxnSpPr>
-          <p:cNvPr id="53" name="Straight Connector 52">
+          <p:cNvPr id="96" name="Straight Connector 95">
             <a:extLst>
               <a:ext uri="{FF2B5EF4-FFF2-40B4-BE49-F238E27FC236}">
-                <a16:creationId xmlns:a16="http://schemas.microsoft.com/office/drawing/2014/main" id="{B6C5074E-756B-8C0B-0D6A-979AE01102F6}"/>
+                <a16:creationId xmlns:a16="http://schemas.microsoft.com/office/drawing/2014/main" id="{E6DF7B1F-D290-B804-1FDD-9FB58C9603DF}"/>
               </a:ext>
             </a:extLst>
           </p:cNvPr>
@@ -3324,7 +3382,7 @@
         </p:nvCxnSpPr>
         <p:spPr>
           <a:xfrm>
-            <a:off x="6004486" y="298898"/>
+            <a:off x="5779898" y="98372"/>
             <a:ext cx="0" cy="2016000"/>
           </a:xfrm>
           <a:prstGeom prst="line">
@@ -3356,10 +3414,10 @@
       </p:cxnSp>
       <p:cxnSp>
         <p:nvCxnSpPr>
-          <p:cNvPr id="55" name="Straight Connector 54">
+          <p:cNvPr id="97" name="Straight Connector 96">
             <a:extLst>
               <a:ext uri="{FF2B5EF4-FFF2-40B4-BE49-F238E27FC236}">
-                <a16:creationId xmlns:a16="http://schemas.microsoft.com/office/drawing/2014/main" id="{281633B8-477C-11CD-AE1C-0CD1BE78E04F}"/>
+                <a16:creationId xmlns:a16="http://schemas.microsoft.com/office/drawing/2014/main" id="{2C2A5231-4A57-01E3-FAAC-AB81E5BE9520}"/>
               </a:ext>
             </a:extLst>
           </p:cNvPr>
@@ -3368,7 +3426,7 @@
         </p:nvCxnSpPr>
         <p:spPr>
           <a:xfrm>
-            <a:off x="4185212" y="294815"/>
+            <a:off x="3960624" y="94289"/>
             <a:ext cx="0" cy="2016000"/>
           </a:xfrm>
           <a:prstGeom prst="line">
@@ -3400,10 +3458,10 @@
       </p:cxnSp>
       <p:cxnSp>
         <p:nvCxnSpPr>
-          <p:cNvPr id="56" name="Straight Connector 55">
+          <p:cNvPr id="98" name="Straight Connector 97">
             <a:extLst>
               <a:ext uri="{FF2B5EF4-FFF2-40B4-BE49-F238E27FC236}">
-                <a16:creationId xmlns:a16="http://schemas.microsoft.com/office/drawing/2014/main" id="{A2368303-36F3-584B-0E05-88F6414DA375}"/>
+                <a16:creationId xmlns:a16="http://schemas.microsoft.com/office/drawing/2014/main" id="{D0D12A0F-36F9-788B-6F72-C1D8129A59EE}"/>
               </a:ext>
             </a:extLst>
           </p:cNvPr>
@@ -3412,7 +3470,7 @@
         </p:nvCxnSpPr>
         <p:spPr>
           <a:xfrm>
-            <a:off x="2382699" y="301661"/>
+            <a:off x="2158111" y="101135"/>
             <a:ext cx="0" cy="2016000"/>
           </a:xfrm>
           <a:prstGeom prst="line">
@@ -3444,10 +3502,10 @@
       </p:cxnSp>
       <p:sp>
         <p:nvSpPr>
-          <p:cNvPr id="60" name="TextBox 59">
+          <p:cNvPr id="99" name="TextBox 98">
             <a:extLst>
               <a:ext uri="{FF2B5EF4-FFF2-40B4-BE49-F238E27FC236}">
-                <a16:creationId xmlns:a16="http://schemas.microsoft.com/office/drawing/2014/main" id="{FFDB1C3D-9C8F-AB78-EF4C-52AF7CBB5270}"/>
+                <a16:creationId xmlns:a16="http://schemas.microsoft.com/office/drawing/2014/main" id="{42440F6C-FA85-913B-4013-3D58AE618B71}"/>
               </a:ext>
             </a:extLst>
           </p:cNvPr>
@@ -3456,7 +3514,7 @@
         </p:nvSpPr>
         <p:spPr>
           <a:xfrm>
-            <a:off x="1610571" y="700284"/>
+            <a:off x="1385983" y="499758"/>
             <a:ext cx="1128642" cy="276999"/>
           </a:xfrm>
           <a:prstGeom prst="rect">
@@ -3482,10 +3540,10 @@
       </p:sp>
       <p:sp>
         <p:nvSpPr>
-          <p:cNvPr id="62" name="TextBox 61">
+          <p:cNvPr id="100" name="TextBox 99">
             <a:extLst>
               <a:ext uri="{FF2B5EF4-FFF2-40B4-BE49-F238E27FC236}">
-                <a16:creationId xmlns:a16="http://schemas.microsoft.com/office/drawing/2014/main" id="{9A41501F-111B-DA27-FEE8-0654A96CFE01}"/>
+                <a16:creationId xmlns:a16="http://schemas.microsoft.com/office/drawing/2014/main" id="{AB9B0DCD-5CD9-96FF-18E4-8CC31480A150}"/>
               </a:ext>
             </a:extLst>
           </p:cNvPr>
@@ -3494,7 +3552,7 @@
         </p:nvSpPr>
         <p:spPr>
           <a:xfrm>
-            <a:off x="1945808" y="1361201"/>
+            <a:off x="1721220" y="1160675"/>
             <a:ext cx="2193036" cy="276999"/>
           </a:xfrm>
           <a:prstGeom prst="rect">
@@ -3520,10 +3578,10 @@
       </p:sp>
       <p:sp>
         <p:nvSpPr>
-          <p:cNvPr id="63" name="TextBox 62">
+          <p:cNvPr id="101" name="TextBox 100">
             <a:extLst>
               <a:ext uri="{FF2B5EF4-FFF2-40B4-BE49-F238E27FC236}">
-                <a16:creationId xmlns:a16="http://schemas.microsoft.com/office/drawing/2014/main" id="{4B9B3DFD-62E4-227C-B168-51EF839475F1}"/>
+                <a16:creationId xmlns:a16="http://schemas.microsoft.com/office/drawing/2014/main" id="{A77CF3E4-6F57-BE2E-627F-B92B737F763F}"/>
               </a:ext>
             </a:extLst>
           </p:cNvPr>
@@ -3532,7 +3590,7 @@
         </p:nvSpPr>
         <p:spPr>
           <a:xfrm>
-            <a:off x="2752185" y="700563"/>
+            <a:off x="2527597" y="500037"/>
             <a:ext cx="1657633" cy="276999"/>
           </a:xfrm>
           <a:prstGeom prst="rect">
@@ -3572,10 +3630,10 @@
       </p:sp>
       <p:sp>
         <p:nvSpPr>
-          <p:cNvPr id="74" name="TextBox 73">
+          <p:cNvPr id="102" name="TextBox 101">
             <a:extLst>
               <a:ext uri="{FF2B5EF4-FFF2-40B4-BE49-F238E27FC236}">
-                <a16:creationId xmlns:a16="http://schemas.microsoft.com/office/drawing/2014/main" id="{C7EEBC11-11DD-7063-2172-52E203615469}"/>
+                <a16:creationId xmlns:a16="http://schemas.microsoft.com/office/drawing/2014/main" id="{F7D9B270-0707-0A8F-50AE-472C017C7040}"/>
               </a:ext>
             </a:extLst>
           </p:cNvPr>
@@ -3584,7 +3642,7 @@
         </p:nvSpPr>
         <p:spPr>
           <a:xfrm>
-            <a:off x="4448192" y="693921"/>
+            <a:off x="4223604" y="493395"/>
             <a:ext cx="1615955" cy="276999"/>
           </a:xfrm>
           <a:prstGeom prst="rect">
@@ -3624,10 +3682,10 @@
       </p:sp>
       <p:sp>
         <p:nvSpPr>
-          <p:cNvPr id="75" name="TextBox 74">
+          <p:cNvPr id="103" name="TextBox 102">
             <a:extLst>
               <a:ext uri="{FF2B5EF4-FFF2-40B4-BE49-F238E27FC236}">
-                <a16:creationId xmlns:a16="http://schemas.microsoft.com/office/drawing/2014/main" id="{DF582A64-1B5B-4592-5A3A-678B5C15C815}"/>
+                <a16:creationId xmlns:a16="http://schemas.microsoft.com/office/drawing/2014/main" id="{18B2F6F4-B379-7ED0-E531-F996200795C3}"/>
               </a:ext>
             </a:extLst>
           </p:cNvPr>
@@ -3636,7 +3694,7 @@
         </p:nvSpPr>
         <p:spPr>
           <a:xfrm>
-            <a:off x="5929728" y="699411"/>
+            <a:off x="5705140" y="498885"/>
             <a:ext cx="1128642" cy="276999"/>
           </a:xfrm>
           <a:prstGeom prst="rect">
@@ -3662,10 +3720,10 @@
       </p:sp>
       <p:sp>
         <p:nvSpPr>
-          <p:cNvPr id="76" name="TextBox 75">
+          <p:cNvPr id="104" name="TextBox 103">
             <a:extLst>
               <a:ext uri="{FF2B5EF4-FFF2-40B4-BE49-F238E27FC236}">
-                <a16:creationId xmlns:a16="http://schemas.microsoft.com/office/drawing/2014/main" id="{4B98C486-1164-A7A5-E298-B9EAAE2AFFDF}"/>
+                <a16:creationId xmlns:a16="http://schemas.microsoft.com/office/drawing/2014/main" id="{55E0EF49-039B-263D-7C52-44C9CBD2FF79}"/>
               </a:ext>
             </a:extLst>
           </p:cNvPr>
@@ -3674,7 +3732,7 @@
         </p:nvSpPr>
         <p:spPr>
           <a:xfrm>
-            <a:off x="3242831" y="2420373"/>
+            <a:off x="3018243" y="2219847"/>
             <a:ext cx="779381" cy="276999"/>
           </a:xfrm>
           <a:prstGeom prst="rect">
@@ -3703,10 +3761,10 @@
       </p:sp>
       <p:sp>
         <p:nvSpPr>
-          <p:cNvPr id="77" name="TextBox 76">
+          <p:cNvPr id="105" name="TextBox 104">
             <a:extLst>
               <a:ext uri="{FF2B5EF4-FFF2-40B4-BE49-F238E27FC236}">
-                <a16:creationId xmlns:a16="http://schemas.microsoft.com/office/drawing/2014/main" id="{B4782F17-0017-9D2A-EDAA-5FB765E05E8A}"/>
+                <a16:creationId xmlns:a16="http://schemas.microsoft.com/office/drawing/2014/main" id="{736B630B-875B-7214-7CC5-BB10E4510353}"/>
               </a:ext>
             </a:extLst>
           </p:cNvPr>
@@ -3715,8 +3773,8 @@
         </p:nvSpPr>
         <p:spPr>
           <a:xfrm>
-            <a:off x="221279" y="328303"/>
-            <a:ext cx="338554" cy="369332"/>
+            <a:off x="481407" y="143819"/>
+            <a:ext cx="1040670" cy="338554"/>
           </a:xfrm>
           <a:prstGeom prst="rect">
             <a:avLst/>
@@ -3730,21 +3788,21 @@
           <a:lstStyle/>
           <a:p>
             <a:r>
-              <a:rPr lang="en-JP" dirty="0">
+              <a:rPr lang="en-JP" sz="1600" dirty="0">
                 <a:latin typeface="Arial" panose="020B0604020202020204" pitchFamily="34" charset="0"/>
                 <a:cs typeface="Arial" panose="020B0604020202020204" pitchFamily="34" charset="0"/>
               </a:rPr>
-              <a:t>A</a:t>
-            </a:r>
-          </a:p>
-        </p:txBody>
-      </p:sp>
-      <p:sp>
-        <p:nvSpPr>
-          <p:cNvPr id="78" name="TextBox 77">
+              <a:t>A: Genes</a:t>
+            </a:r>
+          </a:p>
+        </p:txBody>
+      </p:sp>
+      <p:sp>
+        <p:nvSpPr>
+          <p:cNvPr id="106" name="TextBox 105">
             <a:extLst>
               <a:ext uri="{FF2B5EF4-FFF2-40B4-BE49-F238E27FC236}">
-                <a16:creationId xmlns:a16="http://schemas.microsoft.com/office/drawing/2014/main" id="{F073A116-A048-9BD1-485D-3118DE68EF24}"/>
+                <a16:creationId xmlns:a16="http://schemas.microsoft.com/office/drawing/2014/main" id="{74ACA8E8-BF19-D4CF-5DAA-5E6F3D7B2A83}"/>
               </a:ext>
             </a:extLst>
           </p:cNvPr>
@@ -3753,8 +3811,8 @@
         </p:nvSpPr>
         <p:spPr>
           <a:xfrm>
-            <a:off x="229087" y="2600236"/>
-            <a:ext cx="338554" cy="369332"/>
+            <a:off x="710347" y="2544088"/>
+            <a:ext cx="2018373" cy="338554"/>
           </a:xfrm>
           <a:prstGeom prst="rect">
             <a:avLst/>
@@ -3768,21 +3826,21 @@
           <a:lstStyle/>
           <a:p>
             <a:r>
-              <a:rPr lang="en-JP" dirty="0">
+              <a:rPr lang="en-JP" sz="1600" dirty="0">
                 <a:latin typeface="Arial" panose="020B0604020202020204" pitchFamily="34" charset="0"/>
                 <a:cs typeface="Arial" panose="020B0604020202020204" pitchFamily="34" charset="0"/>
               </a:rPr>
-              <a:t>B</a:t>
+              <a:t>B: Aphid abundance</a:t>
             </a:r>
           </a:p>
         </p:txBody>
       </p:sp>
       <p:cxnSp>
         <p:nvCxnSpPr>
-          <p:cNvPr id="79" name="Straight Connector 78">
+          <p:cNvPr id="107" name="Straight Connector 106">
             <a:extLst>
               <a:ext uri="{FF2B5EF4-FFF2-40B4-BE49-F238E27FC236}">
-                <a16:creationId xmlns:a16="http://schemas.microsoft.com/office/drawing/2014/main" id="{D135AF88-4994-CCAE-F0FA-FEA44783BBB7}"/>
+                <a16:creationId xmlns:a16="http://schemas.microsoft.com/office/drawing/2014/main" id="{A5A829C4-0833-838B-CDC1-C7DA90183B1F}"/>
               </a:ext>
             </a:extLst>
           </p:cNvPr>
@@ -3791,7 +3849,7 @@
         </p:nvCxnSpPr>
         <p:spPr>
           <a:xfrm>
-            <a:off x="5979002" y="657487"/>
+            <a:off x="5754414" y="456961"/>
             <a:ext cx="108000" cy="0"/>
           </a:xfrm>
           <a:prstGeom prst="line">
@@ -3820,10 +3878,10 @@
       </p:cxnSp>
       <p:sp>
         <p:nvSpPr>
-          <p:cNvPr id="2" name="TextBox 1">
+          <p:cNvPr id="108" name="TextBox 107">
             <a:extLst>
               <a:ext uri="{FF2B5EF4-FFF2-40B4-BE49-F238E27FC236}">
-                <a16:creationId xmlns:a16="http://schemas.microsoft.com/office/drawing/2014/main" id="{787317D9-4A96-87FA-B5CD-E911702D02AB}"/>
+                <a16:creationId xmlns:a16="http://schemas.microsoft.com/office/drawing/2014/main" id="{73D1B8F6-65D2-2393-5CDE-6050920507B4}"/>
               </a:ext>
             </a:extLst>
           </p:cNvPr>
@@ -3832,8 +3890,8 @@
         </p:nvSpPr>
         <p:spPr>
           <a:xfrm rot="16200000">
-            <a:off x="-184792" y="3759562"/>
-            <a:ext cx="1790875" cy="338554"/>
+            <a:off x="-131022" y="3344415"/>
+            <a:ext cx="1386918" cy="276999"/>
           </a:xfrm>
           <a:prstGeom prst="rect">
             <a:avLst/>
@@ -3848,15 +3906,210 @@
           <a:p>
             <a:pPr algn="ctr"/>
             <a:r>
+              <a:rPr lang="en-JP" sz="1200" dirty="0">
+                <a:latin typeface="Arial" panose="020B0604020202020204" pitchFamily="34" charset="0"/>
+                <a:cs typeface="Arial" panose="020B0604020202020204" pitchFamily="34" charset="0"/>
+              </a:rPr>
+              <a:t>Association score</a:t>
+            </a:r>
+          </a:p>
+        </p:txBody>
+      </p:sp>
+      <p:sp>
+        <p:nvSpPr>
+          <p:cNvPr id="109" name="TextBox 108">
+            <a:extLst>
+              <a:ext uri="{FF2B5EF4-FFF2-40B4-BE49-F238E27FC236}">
+                <a16:creationId xmlns:a16="http://schemas.microsoft.com/office/drawing/2014/main" id="{67BB95AE-2CC1-6D78-7D1F-E630A994699B}"/>
+              </a:ext>
+            </a:extLst>
+          </p:cNvPr>
+          <p:cNvSpPr txBox="1"/>
+          <p:nvPr/>
+        </p:nvSpPr>
+        <p:spPr>
+          <a:xfrm>
+            <a:off x="697523" y="4292208"/>
+            <a:ext cx="1072730" cy="338554"/>
+          </a:xfrm>
+          <a:prstGeom prst="rect">
+            <a:avLst/>
+          </a:prstGeom>
+          <a:noFill/>
+        </p:spPr>
+        <p:txBody>
+          <a:bodyPr wrap="none" rtlCol="0">
+            <a:spAutoFit/>
+          </a:bodyPr>
+          <a:lstStyle/>
+          <a:p>
+            <a:r>
               <a:rPr lang="en-JP" sz="1600" dirty="0">
                 <a:latin typeface="Arial" panose="020B0604020202020204" pitchFamily="34" charset="0"/>
                 <a:cs typeface="Arial" panose="020B0604020202020204" pitchFamily="34" charset="0"/>
               </a:rPr>
+              <a:t>C: Bolting</a:t>
+            </a:r>
+          </a:p>
+        </p:txBody>
+      </p:sp>
+      <p:sp>
+        <p:nvSpPr>
+          <p:cNvPr id="110" name="TextBox 109">
+            <a:extLst>
+              <a:ext uri="{FF2B5EF4-FFF2-40B4-BE49-F238E27FC236}">
+                <a16:creationId xmlns:a16="http://schemas.microsoft.com/office/drawing/2014/main" id="{496CB7B2-9BA1-7F33-B6AE-5FE81170349A}"/>
+              </a:ext>
+            </a:extLst>
+          </p:cNvPr>
+          <p:cNvSpPr txBox="1"/>
+          <p:nvPr/>
+        </p:nvSpPr>
+        <p:spPr>
+          <a:xfrm>
+            <a:off x="696127" y="6048952"/>
+            <a:ext cx="1345240" cy="338554"/>
+          </a:xfrm>
+          <a:prstGeom prst="rect">
+            <a:avLst/>
+          </a:prstGeom>
+          <a:noFill/>
+        </p:spPr>
+        <p:txBody>
+          <a:bodyPr wrap="none" rtlCol="0">
+            <a:spAutoFit/>
+          </a:bodyPr>
+          <a:lstStyle/>
+          <a:p>
+            <a:r>
+              <a:rPr lang="en-JP" sz="1600" dirty="0">
+                <a:latin typeface="Arial" panose="020B0604020202020204" pitchFamily="34" charset="0"/>
+                <a:cs typeface="Arial" panose="020B0604020202020204" pitchFamily="34" charset="0"/>
+              </a:rPr>
+              <a:t>D: Residuals</a:t>
+            </a:r>
+          </a:p>
+        </p:txBody>
+      </p:sp>
+      <p:sp>
+        <p:nvSpPr>
+          <p:cNvPr id="111" name="TextBox 110">
+            <a:extLst>
+              <a:ext uri="{FF2B5EF4-FFF2-40B4-BE49-F238E27FC236}">
+                <a16:creationId xmlns:a16="http://schemas.microsoft.com/office/drawing/2014/main" id="{9560EAEF-CA60-52CD-8DF4-674D62DB2408}"/>
+              </a:ext>
+            </a:extLst>
+          </p:cNvPr>
+          <p:cNvSpPr txBox="1"/>
+          <p:nvPr/>
+        </p:nvSpPr>
+        <p:spPr>
+          <a:xfrm rot="16200000">
+            <a:off x="-125511" y="5095024"/>
+            <a:ext cx="1386918" cy="276999"/>
+          </a:xfrm>
+          <a:prstGeom prst="rect">
+            <a:avLst/>
+          </a:prstGeom>
+          <a:noFill/>
+        </p:spPr>
+        <p:txBody>
+          <a:bodyPr wrap="none" rtlCol="0">
+            <a:spAutoFit/>
+          </a:bodyPr>
+          <a:lstStyle/>
+          <a:p>
+            <a:pPr algn="ctr"/>
+            <a:r>
+              <a:rPr lang="en-JP" sz="1200" dirty="0">
+                <a:latin typeface="Arial" panose="020B0604020202020204" pitchFamily="34" charset="0"/>
+                <a:cs typeface="Arial" panose="020B0604020202020204" pitchFamily="34" charset="0"/>
+              </a:rPr>
               <a:t>Association score</a:t>
             </a:r>
           </a:p>
         </p:txBody>
       </p:sp>
+      <p:sp>
+        <p:nvSpPr>
+          <p:cNvPr id="112" name="TextBox 111">
+            <a:extLst>
+              <a:ext uri="{FF2B5EF4-FFF2-40B4-BE49-F238E27FC236}">
+                <a16:creationId xmlns:a16="http://schemas.microsoft.com/office/drawing/2014/main" id="{6CE2836A-09A6-344D-4CB8-8DE8FD61994C}"/>
+              </a:ext>
+            </a:extLst>
+          </p:cNvPr>
+          <p:cNvSpPr txBox="1"/>
+          <p:nvPr/>
+        </p:nvSpPr>
+        <p:spPr>
+          <a:xfrm rot="16200000">
+            <a:off x="-133588" y="6847236"/>
+            <a:ext cx="1386918" cy="276999"/>
+          </a:xfrm>
+          <a:prstGeom prst="rect">
+            <a:avLst/>
+          </a:prstGeom>
+          <a:noFill/>
+        </p:spPr>
+        <p:txBody>
+          <a:bodyPr wrap="none" rtlCol="0">
+            <a:spAutoFit/>
+          </a:bodyPr>
+          <a:lstStyle/>
+          <a:p>
+            <a:pPr algn="ctr"/>
+            <a:r>
+              <a:rPr lang="en-JP" sz="1200" dirty="0">
+                <a:latin typeface="Arial" panose="020B0604020202020204" pitchFamily="34" charset="0"/>
+                <a:cs typeface="Arial" panose="020B0604020202020204" pitchFamily="34" charset="0"/>
+              </a:rPr>
+              <a:t>Association score</a:t>
+            </a:r>
+          </a:p>
+        </p:txBody>
+      </p:sp>
+      <p:cxnSp>
+        <p:nvCxnSpPr>
+          <p:cNvPr id="113" name="Straight Connector 112">
+            <a:extLst>
+              <a:ext uri="{FF2B5EF4-FFF2-40B4-BE49-F238E27FC236}">
+                <a16:creationId xmlns:a16="http://schemas.microsoft.com/office/drawing/2014/main" id="{641DFC46-382A-9888-D7B8-D1448238F0ED}"/>
+              </a:ext>
+            </a:extLst>
+          </p:cNvPr>
+          <p:cNvCxnSpPr/>
+          <p:nvPr/>
+        </p:nvCxnSpPr>
+        <p:spPr>
+          <a:xfrm flipH="1">
+            <a:off x="3754710" y="2641075"/>
+            <a:ext cx="6863" cy="4860000"/>
+          </a:xfrm>
+          <a:prstGeom prst="line">
+            <a:avLst/>
+          </a:prstGeom>
+          <a:ln>
+            <a:solidFill>
+              <a:srgbClr val="FF0000"/>
+            </a:solidFill>
+          </a:ln>
+        </p:spPr>
+        <p:style>
+          <a:lnRef idx="1">
+            <a:schemeClr val="accent1"/>
+          </a:lnRef>
+          <a:fillRef idx="0">
+            <a:schemeClr val="accent1"/>
+          </a:fillRef>
+          <a:effectRef idx="0">
+            <a:schemeClr val="accent1"/>
+          </a:effectRef>
+          <a:fontRef idx="minor">
+            <a:schemeClr val="tx1"/>
+          </a:fontRef>
+        </p:style>
+      </p:cxnSp>
     </p:spTree>
     <p:extLst>
       <p:ext uri="{BB962C8B-B14F-4D97-AF65-F5344CB8AC3E}">
@@ -4125,7 +4378,7 @@
   <a:extraClrSchemeLst/>
   <a:extLst>
     <a:ext uri="{05A4C25C-085E-4340-85A3-A5531E510DB2}">
-      <thm15:themeFamily xmlns:thm15="http://schemas.microsoft.com/office/thememl/2012/main" name="Office Theme" id="{62F939B6-93AF-4DB8-9C6B-D6C7DFDC589F}" vid="{4A3C46E8-61CC-4603-A589-7422A47A8E4A}"/>
+      <thm15:themeFamily xmlns:thm15="http://schemas.microsoft.com/office/thememl/2012/main" name="Office Theme 2013 - 2022" id="{62F939B6-93AF-4DB8-9C6B-D6C7DFDC589F}" vid="{4A3C46E8-61CC-4603-A589-7422A47A8E4A}"/>
     </a:ext>
   </a:extLst>
 </a:theme>

</xml_diff>

<commit_message>
ms and code annotation updated
</commit_message>
<xml_diff>
--- a/figures/fig1_comb.pptx
+++ b/figures/fig1_comb.pptx
@@ -243,7 +243,7 @@
           <a:p>
             <a:fld id="{9915773D-6D45-A545-9BEA-022AEEFB4CE4}" type="datetimeFigureOut">
               <a:rPr lang="en-JP" smtClean="0"/>
-              <a:t>2023/02/24</a:t>
+              <a:t>2023/03/07</a:t>
             </a:fld>
             <a:endParaRPr lang="en-JP"/>
           </a:p>
@@ -413,7 +413,7 @@
           <a:p>
             <a:fld id="{9915773D-6D45-A545-9BEA-022AEEFB4CE4}" type="datetimeFigureOut">
               <a:rPr lang="en-JP" smtClean="0"/>
-              <a:t>2023/02/24</a:t>
+              <a:t>2023/03/07</a:t>
             </a:fld>
             <a:endParaRPr lang="en-JP"/>
           </a:p>
@@ -593,7 +593,7 @@
           <a:p>
             <a:fld id="{9915773D-6D45-A545-9BEA-022AEEFB4CE4}" type="datetimeFigureOut">
               <a:rPr lang="en-JP" smtClean="0"/>
-              <a:t>2023/02/24</a:t>
+              <a:t>2023/03/07</a:t>
             </a:fld>
             <a:endParaRPr lang="en-JP"/>
           </a:p>
@@ -763,7 +763,7 @@
           <a:p>
             <a:fld id="{9915773D-6D45-A545-9BEA-022AEEFB4CE4}" type="datetimeFigureOut">
               <a:rPr lang="en-JP" smtClean="0"/>
-              <a:t>2023/02/24</a:t>
+              <a:t>2023/03/07</a:t>
             </a:fld>
             <a:endParaRPr lang="en-JP"/>
           </a:p>
@@ -1007,7 +1007,7 @@
           <a:p>
             <a:fld id="{9915773D-6D45-A545-9BEA-022AEEFB4CE4}" type="datetimeFigureOut">
               <a:rPr lang="en-JP" smtClean="0"/>
-              <a:t>2023/02/24</a:t>
+              <a:t>2023/03/07</a:t>
             </a:fld>
             <a:endParaRPr lang="en-JP"/>
           </a:p>
@@ -1239,7 +1239,7 @@
           <a:p>
             <a:fld id="{9915773D-6D45-A545-9BEA-022AEEFB4CE4}" type="datetimeFigureOut">
               <a:rPr lang="en-JP" smtClean="0"/>
-              <a:t>2023/02/24</a:t>
+              <a:t>2023/03/07</a:t>
             </a:fld>
             <a:endParaRPr lang="en-JP"/>
           </a:p>
@@ -1606,7 +1606,7 @@
           <a:p>
             <a:fld id="{9915773D-6D45-A545-9BEA-022AEEFB4CE4}" type="datetimeFigureOut">
               <a:rPr lang="en-JP" smtClean="0"/>
-              <a:t>2023/02/24</a:t>
+              <a:t>2023/03/07</a:t>
             </a:fld>
             <a:endParaRPr lang="en-JP"/>
           </a:p>
@@ -1724,7 +1724,7 @@
           <a:p>
             <a:fld id="{9915773D-6D45-A545-9BEA-022AEEFB4CE4}" type="datetimeFigureOut">
               <a:rPr lang="en-JP" smtClean="0"/>
-              <a:t>2023/02/24</a:t>
+              <a:t>2023/03/07</a:t>
             </a:fld>
             <a:endParaRPr lang="en-JP"/>
           </a:p>
@@ -1819,7 +1819,7 @@
           <a:p>
             <a:fld id="{9915773D-6D45-A545-9BEA-022AEEFB4CE4}" type="datetimeFigureOut">
               <a:rPr lang="en-JP" smtClean="0"/>
-              <a:t>2023/02/24</a:t>
+              <a:t>2023/03/07</a:t>
             </a:fld>
             <a:endParaRPr lang="en-JP"/>
           </a:p>
@@ -2096,7 +2096,7 @@
           <a:p>
             <a:fld id="{9915773D-6D45-A545-9BEA-022AEEFB4CE4}" type="datetimeFigureOut">
               <a:rPr lang="en-JP" smtClean="0"/>
-              <a:t>2023/02/24</a:t>
+              <a:t>2023/03/07</a:t>
             </a:fld>
             <a:endParaRPr lang="en-JP"/>
           </a:p>
@@ -2353,7 +2353,7 @@
           <a:p>
             <a:fld id="{9915773D-6D45-A545-9BEA-022AEEFB4CE4}" type="datetimeFigureOut">
               <a:rPr lang="en-JP" smtClean="0"/>
-              <a:t>2023/02/24</a:t>
+              <a:t>2023/03/07</a:t>
             </a:fld>
             <a:endParaRPr lang="en-JP"/>
           </a:p>
@@ -2566,7 +2566,7 @@
           <a:p>
             <a:fld id="{9915773D-6D45-A545-9BEA-022AEEFB4CE4}" type="datetimeFigureOut">
               <a:rPr lang="en-JP" smtClean="0"/>
-              <a:t>2023/02/24</a:t>
+              <a:t>2023/03/07</a:t>
             </a:fld>
             <a:endParaRPr lang="en-JP"/>
           </a:p>
@@ -3774,7 +3774,7 @@
         <p:spPr>
           <a:xfrm>
             <a:off x="481407" y="143819"/>
-            <a:ext cx="1040670" cy="338554"/>
+            <a:ext cx="1098378" cy="338554"/>
           </a:xfrm>
           <a:prstGeom prst="rect">
             <a:avLst/>
@@ -3792,7 +3792,7 @@
                 <a:latin typeface="Arial" panose="020B0604020202020204" pitchFamily="34" charset="0"/>
                 <a:cs typeface="Arial" panose="020B0604020202020204" pitchFamily="34" charset="0"/>
               </a:rPr>
-              <a:t>A: Genes</a:t>
+              <a:t>(a) Genes</a:t>
             </a:r>
           </a:p>
         </p:txBody>
@@ -3812,7 +3812,7 @@
         <p:spPr>
           <a:xfrm>
             <a:off x="710347" y="2544088"/>
-            <a:ext cx="2018373" cy="338554"/>
+            <a:ext cx="2076081" cy="338554"/>
           </a:xfrm>
           <a:prstGeom prst="rect">
             <a:avLst/>
@@ -3830,7 +3830,7 @@
                 <a:latin typeface="Arial" panose="020B0604020202020204" pitchFamily="34" charset="0"/>
                 <a:cs typeface="Arial" panose="020B0604020202020204" pitchFamily="34" charset="0"/>
               </a:rPr>
-              <a:t>B: Aphid abundance</a:t>
+              <a:t>(b) Aphid abundance</a:t>
             </a:r>
           </a:p>
         </p:txBody>
@@ -3930,7 +3930,7 @@
         <p:spPr>
           <a:xfrm>
             <a:off x="697523" y="4292208"/>
-            <a:ext cx="1072730" cy="338554"/>
+            <a:ext cx="1107996" cy="338554"/>
           </a:xfrm>
           <a:prstGeom prst="rect">
             <a:avLst/>
@@ -3948,7 +3948,7 @@
                 <a:latin typeface="Arial" panose="020B0604020202020204" pitchFamily="34" charset="0"/>
                 <a:cs typeface="Arial" panose="020B0604020202020204" pitchFamily="34" charset="0"/>
               </a:rPr>
-              <a:t>C: Bolting</a:t>
+              <a:t>(c) Bolting</a:t>
             </a:r>
           </a:p>
         </p:txBody>
@@ -3968,7 +3968,7 @@
         <p:spPr>
           <a:xfrm>
             <a:off x="696127" y="6048952"/>
-            <a:ext cx="1345240" cy="338554"/>
+            <a:ext cx="1391728" cy="338554"/>
           </a:xfrm>
           <a:prstGeom prst="rect">
             <a:avLst/>
@@ -3986,7 +3986,7 @@
                 <a:latin typeface="Arial" panose="020B0604020202020204" pitchFamily="34" charset="0"/>
                 <a:cs typeface="Arial" panose="020B0604020202020204" pitchFamily="34" charset="0"/>
               </a:rPr>
-              <a:t>D: Residuals</a:t>
+              <a:t>(d) Residuals</a:t>
             </a:r>
           </a:p>
         </p:txBody>

</xml_diff>